<commit_message>
Added classwork examples on functions
Added classwork examples on functions
</commit_message>
<xml_diff>
--- a/content/Python_Ch05-FunctionsAndLambdas.pptx
+++ b/content/Python_Ch05-FunctionsAndLambdas.pptx
@@ -10762,7 +10762,7 @@
         </p:nvGraphicFramePr>
         <p:xfrm>
           <a:off x="668004" y="1333227"/>
-          <a:ext cx="10855995" cy="4343909"/>
+          <a:ext cx="10855995" cy="4356451"/>
         </p:xfrm>
         <a:graphic>
           <a:graphicData uri="http://schemas.openxmlformats.org/drawingml/2006/table">
@@ -17941,7 +17941,9 @@
           </a:prstGeom>
         </p:spPr>
         <p:txBody>
-          <a:bodyPr/>
+          <a:bodyPr>
+            <a:normAutofit/>
+          </a:bodyPr>
           <a:lstStyle>
             <a:lvl1pPr>
               <a:defRPr b="1">
@@ -17954,7 +17956,7 @@
           </a:lstStyle>
           <a:p>
             <a:r>
-              <a:rPr dirty="0"/>
+              <a:rPr sz="1600" dirty="0"/>
               <a:t>Ch05_01_simple_function.py</a:t>
             </a:r>
           </a:p>

</xml_diff>